<commit_message>
ajout liens dans le support
</commit_message>
<xml_diff>
--- a/Java101.pptx
+++ b/Java101.pptx
@@ -4385,6 +4385,13 @@
   <p:clrMapOvr>
     <a:masterClrMapping/>
   </p:clrMapOvr>
+  <p:timing>
+    <p:tnLst>
+      <p:par>
+        <p:cTn id="1" dur="indefinite" restart="never" nodeType="tmRoot"/>
+      </p:par>
+    </p:tnLst>
+  </p:timing>
 </p:sld>
 </file>
 
@@ -4553,6 +4560,13 @@
   <p:clrMapOvr>
     <a:masterClrMapping/>
   </p:clrMapOvr>
+  <p:timing>
+    <p:tnLst>
+      <p:par>
+        <p:cTn id="1" dur="indefinite" restart="never" nodeType="tmRoot"/>
+      </p:par>
+    </p:tnLst>
+  </p:timing>
 </p:sld>
 </file>
 
@@ -5048,6 +5062,43 @@
               </a:rPr>
               <a:t> …)</a:t>
             </a:r>
+          </a:p>
+          <a:p>
+            <a:endParaRPr lang="fr-FR" sz="1800" dirty="0">
+              <a:latin typeface="Calibri" panose="020F0502020204030204" pitchFamily="34" charset="0"/>
+            </a:endParaRPr>
+          </a:p>
+          <a:p>
+            <a:endParaRPr lang="fr-FR" sz="1800" dirty="0" smtClean="0">
+              <a:latin typeface="Calibri" panose="020F0502020204030204" pitchFamily="34" charset="0"/>
+            </a:endParaRPr>
+          </a:p>
+          <a:p>
+            <a:pPr marL="109728" indent="0">
+              <a:buNone/>
+            </a:pPr>
+            <a:r>
+              <a:rPr lang="fr-FR" sz="1800" dirty="0">
+                <a:latin typeface="Calibri" panose="020F0502020204030204" pitchFamily="34" charset="0"/>
+                <a:hlinkClick r:id="rId2"/>
+              </a:rPr>
+              <a:t>https://</a:t>
+            </a:r>
+            <a:r>
+              <a:rPr lang="fr-FR" sz="1800" dirty="0" smtClean="0">
+                <a:latin typeface="Calibri" panose="020F0502020204030204" pitchFamily="34" charset="0"/>
+                <a:hlinkClick r:id="rId2"/>
+              </a:rPr>
+              <a:t>www.dotnetperls.com/array-java</a:t>
+            </a:r>
+            <a:endParaRPr lang="fr-FR" sz="1800" dirty="0" smtClean="0">
+              <a:latin typeface="Calibri" panose="020F0502020204030204" pitchFamily="34" charset="0"/>
+            </a:endParaRPr>
+          </a:p>
+          <a:p>
+            <a:pPr marL="109728" indent="0">
+              <a:buNone/>
+            </a:pPr>
             <a:endParaRPr lang="fr-FR" sz="1800" dirty="0">
               <a:latin typeface="Calibri" panose="020F0502020204030204" pitchFamily="34" charset="0"/>
             </a:endParaRPr>
@@ -5064,6 +5115,13 @@
   <p:clrMapOvr>
     <a:masterClrMapping/>
   </p:clrMapOvr>
+  <p:timing>
+    <p:tnLst>
+      <p:par>
+        <p:cTn id="1" dur="indefinite" restart="never" nodeType="tmRoot"/>
+      </p:par>
+    </p:tnLst>
+  </p:timing>
 </p:sld>
 </file>
 
@@ -5200,6 +5258,35 @@
             </a:r>
           </a:p>
           <a:p>
+            <a:endParaRPr lang="fr-FR" sz="1800" dirty="0">
+              <a:latin typeface="Calibri" panose="020F0502020204030204" pitchFamily="34" charset="0"/>
+            </a:endParaRPr>
+          </a:p>
+          <a:p>
+            <a:r>
+              <a:rPr lang="fr-FR" sz="1800" dirty="0">
+                <a:latin typeface="Calibri" panose="020F0502020204030204" pitchFamily="34" charset="0"/>
+                <a:hlinkClick r:id="rId2"/>
+              </a:rPr>
+              <a:t>https://</a:t>
+            </a:r>
+            <a:r>
+              <a:rPr lang="fr-FR" sz="1800" dirty="0" smtClean="0">
+                <a:latin typeface="Calibri" panose="020F0502020204030204" pitchFamily="34" charset="0"/>
+                <a:hlinkClick r:id="rId2"/>
+              </a:rPr>
+              <a:t>www.dotnetperls.com/arraylist-java</a:t>
+            </a:r>
+            <a:endParaRPr lang="fr-FR" sz="1800" dirty="0" smtClean="0">
+              <a:latin typeface="Calibri" panose="020F0502020204030204" pitchFamily="34" charset="0"/>
+            </a:endParaRPr>
+          </a:p>
+          <a:p>
+            <a:endParaRPr lang="fr-FR" sz="1800" dirty="0" smtClean="0">
+              <a:latin typeface="Calibri" panose="020F0502020204030204" pitchFamily="34" charset="0"/>
+            </a:endParaRPr>
+          </a:p>
+          <a:p>
             <a:pPr marL="109728" indent="0">
               <a:buNone/>
             </a:pPr>
@@ -5227,6 +5314,13 @@
   <p:clrMapOvr>
     <a:masterClrMapping/>
   </p:clrMapOvr>
+  <p:timing>
+    <p:tnLst>
+      <p:par>
+        <p:cTn id="1" dur="indefinite" restart="never" nodeType="tmRoot"/>
+      </p:par>
+    </p:tnLst>
+  </p:timing>
 </p:sld>
 </file>
 
@@ -5409,6 +5503,37 @@
               </a:rPr>
               <a:t> si le TS est à prendre en compte</a:t>
             </a:r>
+          </a:p>
+          <a:p>
+            <a:endParaRPr lang="fr-FR" sz="1800" dirty="0">
+              <a:latin typeface="Calibri" panose="020F0502020204030204" pitchFamily="34" charset="0"/>
+            </a:endParaRPr>
+          </a:p>
+          <a:p>
+            <a:r>
+              <a:rPr lang="fr-FR" sz="1800" dirty="0">
+                <a:latin typeface="Calibri" panose="020F0502020204030204" pitchFamily="34" charset="0"/>
+                <a:hlinkClick r:id="rId2"/>
+              </a:rPr>
+              <a:t>https://</a:t>
+            </a:r>
+            <a:r>
+              <a:rPr lang="fr-FR" sz="1800" dirty="0" smtClean="0">
+                <a:latin typeface="Calibri" panose="020F0502020204030204" pitchFamily="34" charset="0"/>
+                <a:hlinkClick r:id="rId2"/>
+              </a:rPr>
+              <a:t>www.dotnetperls.com/hashmap-java</a:t>
+            </a:r>
+            <a:endParaRPr lang="fr-FR" sz="1800" dirty="0" smtClean="0">
+              <a:latin typeface="Calibri" panose="020F0502020204030204" pitchFamily="34" charset="0"/>
+            </a:endParaRPr>
+          </a:p>
+          <a:p>
+            <a:endParaRPr lang="fr-FR" sz="1800" dirty="0">
+              <a:latin typeface="Calibri" panose="020F0502020204030204" pitchFamily="34" charset="0"/>
+            </a:endParaRPr>
+          </a:p>
+          <a:p>
             <a:endParaRPr lang="fr-FR" sz="1800" dirty="0">
               <a:latin typeface="Calibri" panose="020F0502020204030204" pitchFamily="34" charset="0"/>
             </a:endParaRPr>
@@ -5425,6 +5550,13 @@
   <p:clrMapOvr>
     <a:masterClrMapping/>
   </p:clrMapOvr>
+  <p:timing>
+    <p:tnLst>
+      <p:par>
+        <p:cTn id="1" dur="indefinite" restart="never" nodeType="tmRoot"/>
+      </p:par>
+    </p:tnLst>
+  </p:timing>
 </p:sld>
 </file>
 
@@ -5594,6 +5726,35 @@
               <a:latin typeface="Calibri" panose="020F0502020204030204" pitchFamily="34" charset="0"/>
             </a:endParaRPr>
           </a:p>
+          <a:p>
+            <a:endParaRPr lang="fr-FR" sz="1800" dirty="0">
+              <a:latin typeface="Calibri" panose="020F0502020204030204" pitchFamily="34" charset="0"/>
+            </a:endParaRPr>
+          </a:p>
+          <a:p>
+            <a:r>
+              <a:rPr lang="fr-FR" sz="1800" dirty="0">
+                <a:latin typeface="Calibri" panose="020F0502020204030204" pitchFamily="34" charset="0"/>
+                <a:hlinkClick r:id="rId2"/>
+              </a:rPr>
+              <a:t>https://</a:t>
+            </a:r>
+            <a:r>
+              <a:rPr lang="fr-FR" sz="1800" dirty="0" smtClean="0">
+                <a:latin typeface="Calibri" panose="020F0502020204030204" pitchFamily="34" charset="0"/>
+                <a:hlinkClick r:id="rId2"/>
+              </a:rPr>
+              <a:t>www.dotnetperls.com/string-java</a:t>
+            </a:r>
+            <a:endParaRPr lang="fr-FR" sz="1800" dirty="0" smtClean="0">
+              <a:latin typeface="Calibri" panose="020F0502020204030204" pitchFamily="34" charset="0"/>
+            </a:endParaRPr>
+          </a:p>
+          <a:p>
+            <a:endParaRPr lang="fr-FR" sz="1800" dirty="0" smtClean="0">
+              <a:latin typeface="Calibri" panose="020F0502020204030204" pitchFamily="34" charset="0"/>
+            </a:endParaRPr>
+          </a:p>
         </p:txBody>
       </p:sp>
     </p:spTree>
@@ -5606,6 +5767,13 @@
   <p:clrMapOvr>
     <a:masterClrMapping/>
   </p:clrMapOvr>
+  <p:timing>
+    <p:tnLst>
+      <p:par>
+        <p:cTn id="1" dur="indefinite" restart="never" nodeType="tmRoot"/>
+      </p:par>
+    </p:tnLst>
+  </p:timing>
 </p:sld>
 </file>
 
@@ -5809,6 +5977,13 @@
   <p:clrMapOvr>
     <a:masterClrMapping/>
   </p:clrMapOvr>
+  <p:timing>
+    <p:tnLst>
+      <p:par>
+        <p:cTn id="1" dur="indefinite" restart="never" nodeType="tmRoot"/>
+      </p:par>
+    </p:tnLst>
+  </p:timing>
 </p:sld>
 </file>
 

</xml_diff>

<commit_message>
Ajout Slide ForEach Sur Map + corrections diverses
</commit_message>
<xml_diff>
--- a/Java101.pptx
+++ b/Java101.pptx
@@ -14,6 +14,7 @@
     <p:sldId id="262" r:id="rId8"/>
     <p:sldId id="263" r:id="rId9"/>
     <p:sldId id="264" r:id="rId10"/>
+    <p:sldId id="265" r:id="rId11"/>
   </p:sldIdLst>
   <p:sldSz cx="9144000" cy="6858000" type="screen4x3"/>
   <p:notesSz cx="6858000" cy="9144000"/>
@@ -4202,6 +4203,268 @@
 </p:sld>
 </file>
 
+<file path=ppt/slides/slide10.xml><?xml version="1.0" encoding="utf-8"?>
+<p:sld xmlns:a="http://schemas.openxmlformats.org/drawingml/2006/main" xmlns:r="http://schemas.openxmlformats.org/officeDocument/2006/relationships" xmlns:p="http://schemas.openxmlformats.org/presentationml/2006/main">
+  <p:cSld>
+    <p:spTree>
+      <p:nvGrpSpPr>
+        <p:cNvPr id="1" name=""/>
+        <p:cNvGrpSpPr/>
+        <p:nvPr/>
+      </p:nvGrpSpPr>
+      <p:grpSpPr>
+        <a:xfrm>
+          <a:off x="0" y="0"/>
+          <a:ext cx="0" cy="0"/>
+          <a:chOff x="0" y="0"/>
+          <a:chExt cx="0" cy="0"/>
+        </a:xfrm>
+      </p:grpSpPr>
+      <p:sp>
+        <p:nvSpPr>
+          <p:cNvPr id="2" name="Title 1"/>
+          <p:cNvSpPr>
+            <a:spLocks noGrp="1"/>
+          </p:cNvSpPr>
+          <p:nvPr>
+            <p:ph type="title"/>
+          </p:nvPr>
+        </p:nvSpPr>
+        <p:spPr/>
+        <p:txBody>
+          <a:bodyPr/>
+          <a:lstStyle/>
+          <a:p>
+            <a:r>
+              <a:rPr lang="fr-FR" dirty="0" smtClean="0"/>
+              <a:t>For(&lt;type&gt; value : container)</a:t>
+            </a:r>
+            <a:endParaRPr lang="fr-FR" dirty="0"/>
+          </a:p>
+        </p:txBody>
+      </p:sp>
+      <p:sp>
+        <p:nvSpPr>
+          <p:cNvPr id="3" name="Content Placeholder 2"/>
+          <p:cNvSpPr>
+            <a:spLocks noGrp="1"/>
+          </p:cNvSpPr>
+          <p:nvPr>
+            <p:ph idx="1"/>
+          </p:nvPr>
+        </p:nvSpPr>
+        <p:spPr/>
+        <p:txBody>
+          <a:bodyPr>
+            <a:normAutofit lnSpcReduction="10000"/>
+          </a:bodyPr>
+          <a:lstStyle/>
+          <a:p>
+            <a:r>
+              <a:rPr lang="fr-FR" sz="1800" dirty="0" smtClean="0">
+                <a:latin typeface="Calibri" panose="020F0502020204030204" pitchFamily="34" charset="0"/>
+              </a:rPr>
+              <a:t>Cette syntaxe exploite l’</a:t>
+            </a:r>
+            <a:r>
+              <a:rPr lang="fr-FR" sz="1800" dirty="0" err="1" smtClean="0">
+                <a:latin typeface="Calibri" panose="020F0502020204030204" pitchFamily="34" charset="0"/>
+              </a:rPr>
+              <a:t>itérateur</a:t>
+            </a:r>
+            <a:r>
+              <a:rPr lang="fr-FR" sz="1800" dirty="0" smtClean="0">
+                <a:latin typeface="Calibri" panose="020F0502020204030204" pitchFamily="34" charset="0"/>
+              </a:rPr>
+              <a:t> interne aux collections et tableaux de java</a:t>
+            </a:r>
+          </a:p>
+          <a:p>
+            <a:r>
+              <a:rPr lang="fr-FR" sz="1800" dirty="0" smtClean="0">
+                <a:latin typeface="Calibri" panose="020F0502020204030204" pitchFamily="34" charset="0"/>
+              </a:rPr>
+              <a:t>Le container est le tableau ou la Collection que l’on souhaite traverser , la value est la valeur pointée par l’</a:t>
+            </a:r>
+            <a:r>
+              <a:rPr lang="fr-FR" sz="1800" dirty="0" err="1" smtClean="0">
+                <a:latin typeface="Calibri" panose="020F0502020204030204" pitchFamily="34" charset="0"/>
+              </a:rPr>
+              <a:t>itérateur</a:t>
+            </a:r>
+            <a:r>
+              <a:rPr lang="fr-FR" sz="1800" dirty="0" smtClean="0">
+                <a:latin typeface="Calibri" panose="020F0502020204030204" pitchFamily="34" charset="0"/>
+              </a:rPr>
+              <a:t> à chaque passage de la boucle jusqu’à exhaustion du container</a:t>
+            </a:r>
+          </a:p>
+          <a:p>
+            <a:endParaRPr lang="fr-FR" sz="1800" dirty="0">
+              <a:latin typeface="Calibri" panose="020F0502020204030204" pitchFamily="34" charset="0"/>
+            </a:endParaRPr>
+          </a:p>
+          <a:p>
+            <a:pPr marL="109728" indent="0">
+              <a:buNone/>
+            </a:pPr>
+            <a:r>
+              <a:rPr lang="fr-FR" sz="2600" dirty="0" smtClean="0">
+                <a:latin typeface="+mj-lt"/>
+              </a:rPr>
+              <a:t>For(</a:t>
+            </a:r>
+            <a:r>
+              <a:rPr lang="fr-FR" sz="2600" dirty="0" err="1" smtClean="0">
+                <a:latin typeface="+mj-lt"/>
+              </a:rPr>
+              <a:t>Map.Entry</a:t>
+            </a:r>
+            <a:r>
+              <a:rPr lang="fr-FR" sz="2600" dirty="0" smtClean="0">
+                <a:latin typeface="+mj-lt"/>
+              </a:rPr>
+              <a:t>&lt;</a:t>
+            </a:r>
+            <a:r>
+              <a:rPr lang="fr-FR" sz="2600" dirty="0" err="1" smtClean="0">
+                <a:latin typeface="+mj-lt"/>
+              </a:rPr>
+              <a:t>type,type</a:t>
+            </a:r>
+            <a:r>
+              <a:rPr lang="fr-FR" sz="2600" dirty="0" smtClean="0">
+                <a:latin typeface="+mj-lt"/>
+              </a:rPr>
+              <a:t>&gt; entry : </a:t>
+            </a:r>
+            <a:r>
+              <a:rPr lang="fr-FR" sz="2600" dirty="0" err="1" smtClean="0">
+                <a:latin typeface="+mj-lt"/>
+              </a:rPr>
+              <a:t>map.entrySet</a:t>
+            </a:r>
+            <a:r>
+              <a:rPr lang="fr-FR" sz="2600" dirty="0" smtClean="0">
+                <a:latin typeface="+mj-lt"/>
+              </a:rPr>
+              <a:t>())</a:t>
+            </a:r>
+          </a:p>
+          <a:p>
+            <a:pPr marL="109728" indent="0">
+              <a:buNone/>
+            </a:pPr>
+            <a:r>
+              <a:rPr lang="fr-FR" sz="2600" dirty="0" smtClean="0">
+                <a:latin typeface="+mj-lt"/>
+              </a:rPr>
+              <a:t>{</a:t>
+            </a:r>
+          </a:p>
+          <a:p>
+            <a:pPr marL="109728" indent="0">
+              <a:buNone/>
+            </a:pPr>
+            <a:r>
+              <a:rPr lang="fr-FR" sz="2600" dirty="0">
+                <a:latin typeface="+mj-lt"/>
+              </a:rPr>
+              <a:t>	</a:t>
+            </a:r>
+            <a:r>
+              <a:rPr lang="fr-FR" sz="2600" dirty="0" err="1" smtClean="0">
+                <a:latin typeface="+mj-lt"/>
+              </a:rPr>
+              <a:t>entry.getKey</a:t>
+            </a:r>
+            <a:r>
+              <a:rPr lang="fr-FR" sz="2600" dirty="0" smtClean="0">
+                <a:latin typeface="+mj-lt"/>
+              </a:rPr>
+              <a:t>(); //Accède à la clé</a:t>
+            </a:r>
+          </a:p>
+          <a:p>
+            <a:pPr marL="109728" indent="0">
+              <a:buNone/>
+            </a:pPr>
+            <a:r>
+              <a:rPr lang="fr-FR" sz="2600" dirty="0">
+                <a:latin typeface="+mj-lt"/>
+              </a:rPr>
+              <a:t>	</a:t>
+            </a:r>
+            <a:r>
+              <a:rPr lang="fr-FR" sz="2600" dirty="0" err="1" smtClean="0">
+                <a:latin typeface="+mj-lt"/>
+              </a:rPr>
+              <a:t>entry.getValue</a:t>
+            </a:r>
+            <a:r>
+              <a:rPr lang="fr-FR" sz="2600" dirty="0" smtClean="0">
+                <a:latin typeface="+mj-lt"/>
+              </a:rPr>
+              <a:t>(); // Accède à la valeur</a:t>
+            </a:r>
+          </a:p>
+          <a:p>
+            <a:pPr marL="109728" indent="0">
+              <a:buNone/>
+            </a:pPr>
+            <a:r>
+              <a:rPr lang="fr-FR" sz="2600" dirty="0" smtClean="0">
+                <a:latin typeface="+mj-lt"/>
+              </a:rPr>
+              <a:t>}</a:t>
+            </a:r>
+          </a:p>
+          <a:p>
+            <a:pPr marL="109728" indent="0">
+              <a:buNone/>
+            </a:pPr>
+            <a:endParaRPr lang="fr-FR" sz="2600" dirty="0">
+              <a:latin typeface="Calibri" panose="020F0502020204030204" pitchFamily="34" charset="0"/>
+            </a:endParaRPr>
+          </a:p>
+          <a:p>
+            <a:r>
+              <a:rPr lang="fr-FR" sz="1800" dirty="0" smtClean="0">
+                <a:latin typeface="Calibri" panose="020F0502020204030204" pitchFamily="34" charset="0"/>
+              </a:rPr>
+              <a:t>Traverse d’une collection associative (Interface </a:t>
+            </a:r>
+            <a:r>
+              <a:rPr lang="fr-FR" sz="1800" dirty="0" err="1" smtClean="0">
+                <a:latin typeface="Calibri" panose="020F0502020204030204" pitchFamily="34" charset="0"/>
+              </a:rPr>
+              <a:t>Map</a:t>
+            </a:r>
+            <a:r>
+              <a:rPr lang="fr-FR" sz="1800" dirty="0" smtClean="0">
+                <a:latin typeface="Calibri" panose="020F0502020204030204" pitchFamily="34" charset="0"/>
+              </a:rPr>
+              <a:t>)</a:t>
+            </a:r>
+            <a:endParaRPr lang="fr-FR" sz="1800" dirty="0">
+              <a:latin typeface="Calibri" panose="020F0502020204030204" pitchFamily="34" charset="0"/>
+            </a:endParaRPr>
+          </a:p>
+        </p:txBody>
+      </p:sp>
+    </p:spTree>
+    <p:extLst>
+      <p:ext uri="{BB962C8B-B14F-4D97-AF65-F5344CB8AC3E}">
+        <p14:creationId xmlns:p14="http://schemas.microsoft.com/office/powerpoint/2010/main" val="1773800605"/>
+      </p:ext>
+    </p:extLst>
+  </p:cSld>
+  <p:clrMapOvr>
+    <a:masterClrMapping/>
+  </p:clrMapOvr>
+</p:sld>
+</file>
+
 <file path=ppt/slides/slide2.xml><?xml version="1.0" encoding="utf-8"?>
 <p:sld xmlns:a="http://schemas.openxmlformats.org/drawingml/2006/main" xmlns:r="http://schemas.openxmlformats.org/officeDocument/2006/relationships" xmlns:p="http://schemas.openxmlformats.org/presentationml/2006/main">
   <p:cSld>
@@ -4595,8 +4858,8 @@
         </p:nvSpPr>
         <p:spPr>
           <a:xfrm>
-            <a:off x="4136400" y="2512800"/>
-            <a:ext cx="1731000" cy="607800"/>
+            <a:off x="3886200" y="2512800"/>
+            <a:ext cx="1828800" cy="607800"/>
           </a:xfrm>
           <a:prstGeom prst="rect">
             <a:avLst/>
@@ -4641,8 +4904,8 @@
         </p:nvSpPr>
         <p:spPr>
           <a:xfrm>
-            <a:off x="2661600" y="2512800"/>
-            <a:ext cx="1453200" cy="609600"/>
+            <a:off x="2362200" y="2511000"/>
+            <a:ext cx="1524000" cy="609600"/>
           </a:xfrm>
           <a:prstGeom prst="rect">
             <a:avLst/>
@@ -4687,8 +4950,8 @@
         </p:nvSpPr>
         <p:spPr>
           <a:xfrm>
-            <a:off x="1796400" y="2512800"/>
-            <a:ext cx="838200" cy="1066800"/>
+            <a:off x="1600200" y="2512800"/>
+            <a:ext cx="762000" cy="1066800"/>
           </a:xfrm>
           <a:prstGeom prst="rect">
             <a:avLst/>
@@ -4733,8 +4996,8 @@
         </p:nvSpPr>
         <p:spPr>
           <a:xfrm>
-            <a:off x="457200" y="2209800"/>
-            <a:ext cx="1447800" cy="1828800"/>
+            <a:off x="228600" y="2209800"/>
+            <a:ext cx="1371600" cy="1828800"/>
           </a:xfrm>
           <a:prstGeom prst="rect">
             <a:avLst/>
@@ -4804,7 +5067,12 @@
             <p:ph idx="1"/>
           </p:nvPr>
         </p:nvSpPr>
-        <p:spPr/>
+        <p:spPr>
+          <a:xfrm>
+            <a:off x="152400" y="2286000"/>
+            <a:ext cx="8839200" cy="4288536"/>
+          </a:xfrm>
+        </p:spPr>
         <p:txBody>
           <a:bodyPr/>
           <a:lstStyle/>
@@ -4835,8 +5103,21 @@
             </a:r>
             <a:r>
               <a:rPr lang="fr-FR" sz="1800" dirty="0" smtClean="0"/>
-              <a:t>  &lt;type retour&gt; &lt;nom méthode&gt; (&lt;arguments&gt;) {…}</a:t>
-            </a:r>
+              <a:t>  &lt;type retour&gt; &lt;nom méthode&gt; (&lt;arguments&gt;) </a:t>
+            </a:r>
+            <a:r>
+              <a:rPr lang="fr-FR" sz="1800" dirty="0" smtClean="0"/>
+              <a:t>{…} [</a:t>
+            </a:r>
+            <a:r>
+              <a:rPr lang="fr-FR" sz="1800" dirty="0" err="1" smtClean="0"/>
+              <a:t>throws</a:t>
+            </a:r>
+            <a:r>
+              <a:rPr lang="fr-FR" sz="1800" dirty="0" smtClean="0"/>
+              <a:t> …]</a:t>
+            </a:r>
+            <a:endParaRPr lang="fr-FR" sz="1800" dirty="0" smtClean="0"/>
           </a:p>
           <a:p>
             <a:pPr marL="109728" indent="0">
@@ -4964,7 +5245,13 @@
               <a:rPr lang="fr-FR" sz="1800" dirty="0" smtClean="0">
                 <a:latin typeface="Calibri" panose="020F0502020204030204" pitchFamily="34" charset="0"/>
               </a:rPr>
-              <a:t>&lt;type&gt;[&lt;taille&gt;]  ou</a:t>
+              <a:t>&lt;type&gt;[&lt;taille&gt;] </a:t>
+            </a:r>
+            <a:r>
+              <a:rPr lang="fr-FR" sz="1800" dirty="0" smtClean="0">
+                <a:latin typeface="Calibri" panose="020F0502020204030204" pitchFamily="34" charset="0"/>
+              </a:rPr>
+              <a:t> = Déclaration explicite {a1,a2,a3,…}</a:t>
             </a:r>
           </a:p>
           <a:p>
@@ -4975,6 +5262,23 @@
               <a:rPr lang="fr-FR" sz="1800" dirty="0" smtClean="0">
                 <a:latin typeface="Calibri" panose="020F0502020204030204" pitchFamily="34" charset="0"/>
               </a:rPr>
+              <a:t> </a:t>
+            </a:r>
+            <a:r>
+              <a:rPr lang="fr-FR" sz="1800" dirty="0" smtClean="0">
+                <a:latin typeface="Calibri" panose="020F0502020204030204" pitchFamily="34" charset="0"/>
+              </a:rPr>
+              <a:t>ou</a:t>
+            </a:r>
+          </a:p>
+          <a:p>
+            <a:pPr marL="109728" indent="0">
+              <a:buNone/>
+            </a:pPr>
+            <a:r>
+              <a:rPr lang="fr-FR" sz="1800" dirty="0" smtClean="0">
+                <a:latin typeface="Calibri" panose="020F0502020204030204" pitchFamily="34" charset="0"/>
+              </a:rPr>
               <a:t>&lt;type&gt;[] = tableau généré au </a:t>
             </a:r>
             <a:r>
@@ -4982,6 +5286,26 @@
                 <a:latin typeface="Calibri" panose="020F0502020204030204" pitchFamily="34" charset="0"/>
               </a:rPr>
               <a:t>runtime</a:t>
+            </a:r>
+            <a:endParaRPr lang="fr-FR" sz="1800" dirty="0" smtClean="0">
+              <a:latin typeface="Calibri" panose="020F0502020204030204" pitchFamily="34" charset="0"/>
+            </a:endParaRPr>
+          </a:p>
+          <a:p>
+            <a:pPr marL="109728" indent="0">
+              <a:buNone/>
+            </a:pPr>
+            <a:r>
+              <a:rPr lang="fr-FR" sz="1800" dirty="0" smtClean="0">
+                <a:latin typeface="Calibri" panose="020F0502020204030204" pitchFamily="34" charset="0"/>
+              </a:rPr>
+              <a:t>&lt;type&gt;[][] tableau </a:t>
+            </a:r>
+            <a:r>
+              <a:rPr lang="fr-FR" sz="1800" dirty="0" smtClean="0">
+                <a:latin typeface="Calibri" panose="020F0502020204030204" pitchFamily="34" charset="0"/>
+              </a:rPr>
+              <a:t>multidimensionnels</a:t>
             </a:r>
             <a:endParaRPr lang="fr-FR" sz="1800" dirty="0" smtClean="0">
               <a:latin typeface="Calibri" panose="020F0502020204030204" pitchFamily="34" charset="0"/>
@@ -4996,47 +5320,49 @@
             </a:endParaRPr>
           </a:p>
           <a:p>
-            <a:pPr marL="109728" indent="0">
-              <a:buNone/>
-            </a:pPr>
             <a:r>
               <a:rPr lang="fr-FR" sz="1800" dirty="0" smtClean="0">
                 <a:latin typeface="Calibri" panose="020F0502020204030204" pitchFamily="34" charset="0"/>
               </a:rPr>
-              <a:t>&lt;type&gt;[][] tableau </a:t>
-            </a:r>
-            <a:r>
-              <a:rPr lang="fr-FR" sz="1800" dirty="0" err="1" smtClean="0">
-                <a:latin typeface="Calibri" panose="020F0502020204030204" pitchFamily="34" charset="0"/>
-              </a:rPr>
-              <a:t>multi-dimensionnels</a:t>
-            </a:r>
-            <a:endParaRPr lang="fr-FR" sz="1800" dirty="0" smtClean="0">
-              <a:latin typeface="Calibri" panose="020F0502020204030204" pitchFamily="34" charset="0"/>
-            </a:endParaRPr>
-          </a:p>
-          <a:p>
-            <a:pPr marL="109728" indent="0">
-              <a:buNone/>
-            </a:pPr>
-            <a:endParaRPr lang="fr-FR" sz="1800" dirty="0" smtClean="0">
-              <a:latin typeface="Calibri" panose="020F0502020204030204" pitchFamily="34" charset="0"/>
-            </a:endParaRPr>
+              <a:t>Les tableaux une fois assignés ne peuvent varier du point de vue du nombre d’éléments</a:t>
+            </a:r>
           </a:p>
           <a:p>
             <a:r>
               <a:rPr lang="fr-FR" sz="1800" dirty="0" smtClean="0">
                 <a:latin typeface="Calibri" panose="020F0502020204030204" pitchFamily="34" charset="0"/>
               </a:rPr>
-              <a:t>Les tableaux une fois assignés ne peuvent varier du point de vue du nombre d’éléments</a:t>
-            </a:r>
-          </a:p>
-          <a:p>
+              <a:t>Ils constituent </a:t>
+            </a:r>
             <a:r>
               <a:rPr lang="fr-FR" sz="1800" dirty="0" smtClean="0">
                 <a:latin typeface="Calibri" panose="020F0502020204030204" pitchFamily="34" charset="0"/>
               </a:rPr>
-              <a:t>Il constitue cependant des structure de données plus légères et donc plus performantes que leurs contreparties dynamique (List / </a:t>
+              <a:t>cependant des </a:t>
+            </a:r>
+            <a:r>
+              <a:rPr lang="fr-FR" sz="1800" dirty="0" smtClean="0">
+                <a:latin typeface="Calibri" panose="020F0502020204030204" pitchFamily="34" charset="0"/>
+              </a:rPr>
+              <a:t>structures </a:t>
+            </a:r>
+            <a:r>
+              <a:rPr lang="fr-FR" sz="1800" dirty="0" smtClean="0">
+                <a:latin typeface="Calibri" panose="020F0502020204030204" pitchFamily="34" charset="0"/>
+              </a:rPr>
+              <a:t>de données plus légères et donc plus performantes que leurs contreparties </a:t>
+            </a:r>
+            <a:r>
+              <a:rPr lang="fr-FR" sz="1800" dirty="0" smtClean="0">
+                <a:latin typeface="Calibri" panose="020F0502020204030204" pitchFamily="34" charset="0"/>
+              </a:rPr>
+              <a:t>dynamiques </a:t>
+            </a:r>
+            <a:r>
+              <a:rPr lang="fr-FR" sz="1800" dirty="0" smtClean="0">
+                <a:latin typeface="Calibri" panose="020F0502020204030204" pitchFamily="34" charset="0"/>
+              </a:rPr>
+              <a:t>(List / </a:t>
             </a:r>
             <a:r>
               <a:rPr lang="fr-FR" sz="1800" dirty="0" err="1" smtClean="0">

</xml_diff>